<commit_message>
Revert "UPF IP overlap"
This reverts commit aa27073a64bc6f81777792c741985d00ed590c2d.
</commit_message>
<xml_diff>
--- a/docs/Multi-cluster_test/Multicluster-test.pptx
+++ b/docs/Multi-cluster_test/Multicluster-test.pptx
@@ -116,7 +116,7 @@
 <file path=ppt/revisionInfo.xml><?xml version="1.0" encoding="utf-8"?>
 <p1510:revInfo xmlns:a="http://schemas.openxmlformats.org/drawingml/2006/main" xmlns:r="http://schemas.openxmlformats.org/officeDocument/2006/relationships" xmlns:p1510="http://schemas.microsoft.com/office/powerpoint/2015/10/main">
   <p1510:revLst>
-    <p1510:client id="{26CA862B-7CC0-49B5-9129-28CD4CF9333B}" v="245" dt="2024-06-17T02:02:08.185"/>
+    <p1510:client id="{26CA862B-7CC0-49B5-9129-28CD4CF9333B}" v="244" dt="2024-02-04T02:18:56.153"/>
   </p1510:revLst>
 </p1510:revInfo>
 </file>
@@ -126,12 +126,12 @@
   <pc:docChgLst>
     <pc:chgData name="Danilo José Granados" userId="bee369f06cde55e4" providerId="LiveId" clId="{26CA862B-7CC0-49B5-9129-28CD4CF9333B}"/>
     <pc:docChg chg="undo custSel addSld delSld modSld">
-      <pc:chgData name="Danilo José Granados" userId="bee369f06cde55e4" providerId="LiveId" clId="{26CA862B-7CC0-49B5-9129-28CD4CF9333B}" dt="2024-06-17T02:02:51.782" v="1310" actId="1076"/>
+      <pc:chgData name="Danilo José Granados" userId="bee369f06cde55e4" providerId="LiveId" clId="{26CA862B-7CC0-49B5-9129-28CD4CF9333B}" dt="2024-02-04T02:26:31.256" v="1299" actId="1076"/>
       <pc:docMkLst>
         <pc:docMk/>
       </pc:docMkLst>
       <pc:sldChg chg="addSp delSp modSp mod">
-        <pc:chgData name="Danilo José Granados" userId="bee369f06cde55e4" providerId="LiveId" clId="{26CA862B-7CC0-49B5-9129-28CD4CF9333B}" dt="2024-06-17T02:02:51.782" v="1310" actId="1076"/>
+        <pc:chgData name="Danilo José Granados" userId="bee369f06cde55e4" providerId="LiveId" clId="{26CA862B-7CC0-49B5-9129-28CD4CF9333B}" dt="2024-02-04T02:26:31.256" v="1299" actId="1076"/>
         <pc:sldMkLst>
           <pc:docMk/>
           <pc:sldMk cId="3293131006" sldId="256"/>
@@ -145,7 +145,7 @@
           </ac:spMkLst>
         </pc:spChg>
         <pc:spChg chg="add mod">
-          <ac:chgData name="Danilo José Granados" userId="bee369f06cde55e4" providerId="LiveId" clId="{26CA862B-7CC0-49B5-9129-28CD4CF9333B}" dt="2024-06-17T02:02:02.032" v="1304" actId="14100"/>
+          <ac:chgData name="Danilo José Granados" userId="bee369f06cde55e4" providerId="LiveId" clId="{26CA862B-7CC0-49B5-9129-28CD4CF9333B}" dt="2024-02-02T12:35:24.452" v="1117" actId="692"/>
           <ac:spMkLst>
             <pc:docMk/>
             <pc:sldMk cId="3293131006" sldId="256"/>
@@ -217,7 +217,7 @@
           </ac:spMkLst>
         </pc:spChg>
         <pc:spChg chg="mod">
-          <ac:chgData name="Danilo José Granados" userId="bee369f06cde55e4" providerId="LiveId" clId="{26CA862B-7CC0-49B5-9129-28CD4CF9333B}" dt="2024-06-17T02:01:52.652" v="1302" actId="1076"/>
+          <ac:chgData name="Danilo José Granados" userId="bee369f06cde55e4" providerId="LiveId" clId="{26CA862B-7CC0-49B5-9129-28CD4CF9333B}" dt="2024-02-02T00:31:03.392" v="1009" actId="1037"/>
           <ac:spMkLst>
             <pc:docMk/>
             <pc:sldMk cId="3293131006" sldId="256"/>
@@ -225,7 +225,7 @@
           </ac:spMkLst>
         </pc:spChg>
         <pc:spChg chg="mod">
-          <ac:chgData name="Danilo José Granados" userId="bee369f06cde55e4" providerId="LiveId" clId="{26CA862B-7CC0-49B5-9129-28CD4CF9333B}" dt="2024-06-17T02:01:53.235" v="1303" actId="1076"/>
+          <ac:chgData name="Danilo José Granados" userId="bee369f06cde55e4" providerId="LiveId" clId="{26CA862B-7CC0-49B5-9129-28CD4CF9333B}" dt="2024-02-02T00:31:03.392" v="1009" actId="1037"/>
           <ac:spMkLst>
             <pc:docMk/>
             <pc:sldMk cId="3293131006" sldId="256"/>
@@ -321,7 +321,7 @@
           </ac:spMkLst>
         </pc:spChg>
         <pc:spChg chg="add mod">
-          <ac:chgData name="Danilo José Granados" userId="bee369f06cde55e4" providerId="LiveId" clId="{26CA862B-7CC0-49B5-9129-28CD4CF9333B}" dt="2024-06-17T02:02:51.782" v="1310" actId="1076"/>
+          <ac:chgData name="Danilo José Granados" userId="bee369f06cde55e4" providerId="LiveId" clId="{26CA862B-7CC0-49B5-9129-28CD4CF9333B}" dt="2024-02-02T00:10:08.131" v="573" actId="1076"/>
           <ac:spMkLst>
             <pc:docMk/>
             <pc:sldMk cId="3293131006" sldId="256"/>
@@ -342,14 +342,6 @@
             <pc:docMk/>
             <pc:sldMk cId="3293131006" sldId="256"/>
             <ac:spMk id="45" creationId="{1F5EF80A-11FA-D842-CAAA-B3E58438F345}"/>
-          </ac:spMkLst>
-        </pc:spChg>
-        <pc:spChg chg="add mod">
-          <ac:chgData name="Danilo José Granados" userId="bee369f06cde55e4" providerId="LiveId" clId="{26CA862B-7CC0-49B5-9129-28CD4CF9333B}" dt="2024-06-17T02:02:20.043" v="1307" actId="14100"/>
-          <ac:spMkLst>
-            <pc:docMk/>
-            <pc:sldMk cId="3293131006" sldId="256"/>
-            <ac:spMk id="47" creationId="{E7F8FF13-222E-91FD-596A-B83C13FE8437}"/>
           </ac:spMkLst>
         </pc:spChg>
         <pc:spChg chg="add mod">
@@ -417,7 +409,7 @@
           </ac:picMkLst>
         </pc:picChg>
         <pc:picChg chg="add mod">
-          <ac:chgData name="Danilo José Granados" userId="bee369f06cde55e4" providerId="LiveId" clId="{26CA862B-7CC0-49B5-9129-28CD4CF9333B}" dt="2024-06-17T02:02:51.782" v="1310" actId="1076"/>
+          <ac:chgData name="Danilo José Granados" userId="bee369f06cde55e4" providerId="LiveId" clId="{26CA862B-7CC0-49B5-9129-28CD4CF9333B}" dt="2024-02-02T00:10:08.131" v="573" actId="1076"/>
           <ac:picMkLst>
             <pc:docMk/>
             <pc:sldMk cId="3293131006" sldId="256"/>
@@ -449,7 +441,7 @@
           </ac:picMkLst>
         </pc:picChg>
         <pc:cxnChg chg="mod">
-          <ac:chgData name="Danilo José Granados" userId="bee369f06cde55e4" providerId="LiveId" clId="{26CA862B-7CC0-49B5-9129-28CD4CF9333B}" dt="2024-06-17T02:01:52.652" v="1302" actId="1076"/>
+          <ac:chgData name="Danilo José Granados" userId="bee369f06cde55e4" providerId="LiveId" clId="{26CA862B-7CC0-49B5-9129-28CD4CF9333B}" dt="2024-02-02T00:31:03.392" v="1009" actId="1037"/>
           <ac:cxnSpMkLst>
             <pc:docMk/>
             <pc:sldMk cId="3293131006" sldId="256"/>
@@ -465,7 +457,7 @@
           </ac:cxnSpMkLst>
         </pc:cxnChg>
         <pc:cxnChg chg="mod">
-          <ac:chgData name="Danilo José Granados" userId="bee369f06cde55e4" providerId="LiveId" clId="{26CA862B-7CC0-49B5-9129-28CD4CF9333B}" dt="2024-06-17T02:01:52.652" v="1302" actId="1076"/>
+          <ac:chgData name="Danilo José Granados" userId="bee369f06cde55e4" providerId="LiveId" clId="{26CA862B-7CC0-49B5-9129-28CD4CF9333B}" dt="2024-02-02T00:31:03.392" v="1009" actId="1037"/>
           <ac:cxnSpMkLst>
             <pc:docMk/>
             <pc:sldMk cId="3293131006" sldId="256"/>
@@ -481,7 +473,7 @@
           </ac:cxnSpMkLst>
         </pc:cxnChg>
         <pc:cxnChg chg="mod">
-          <ac:chgData name="Danilo José Granados" userId="bee369f06cde55e4" providerId="LiveId" clId="{26CA862B-7CC0-49B5-9129-28CD4CF9333B}" dt="2024-06-17T02:01:53.235" v="1303" actId="1076"/>
+          <ac:chgData name="Danilo José Granados" userId="bee369f06cde55e4" providerId="LiveId" clId="{26CA862B-7CC0-49B5-9129-28CD4CF9333B}" dt="2024-02-02T00:31:03.392" v="1009" actId="1037"/>
           <ac:cxnSpMkLst>
             <pc:docMk/>
             <pc:sldMk cId="3293131006" sldId="256"/>
@@ -561,7 +553,7 @@
           </ac:cxnSpMkLst>
         </pc:cxnChg>
         <pc:cxnChg chg="mod">
-          <ac:chgData name="Danilo José Granados" userId="bee369f06cde55e4" providerId="LiveId" clId="{26CA862B-7CC0-49B5-9129-28CD4CF9333B}" dt="2024-06-17T02:01:53.235" v="1303" actId="1076"/>
+          <ac:chgData name="Danilo José Granados" userId="bee369f06cde55e4" providerId="LiveId" clId="{26CA862B-7CC0-49B5-9129-28CD4CF9333B}" dt="2024-02-02T00:31:03.392" v="1009" actId="1037"/>
           <ac:cxnSpMkLst>
             <pc:docMk/>
             <pc:sldMk cId="3293131006" sldId="256"/>
@@ -1687,7 +1679,7 @@
           <a:p>
             <a:fld id="{50E0B805-1BA4-4D1C-BB31-7A9369EE73F8}" type="datetimeFigureOut">
               <a:rPr lang="es-CO" smtClean="0"/>
-              <a:t>16/06/2024</a:t>
+              <a:t>1/02/2024</a:t>
             </a:fld>
             <a:endParaRPr lang="es-CO"/>
           </a:p>
@@ -1857,7 +1849,7 @@
           <a:p>
             <a:fld id="{50E0B805-1BA4-4D1C-BB31-7A9369EE73F8}" type="datetimeFigureOut">
               <a:rPr lang="es-CO" smtClean="0"/>
-              <a:t>16/06/2024</a:t>
+              <a:t>1/02/2024</a:t>
             </a:fld>
             <a:endParaRPr lang="es-CO"/>
           </a:p>
@@ -2037,7 +2029,7 @@
           <a:p>
             <a:fld id="{50E0B805-1BA4-4D1C-BB31-7A9369EE73F8}" type="datetimeFigureOut">
               <a:rPr lang="es-CO" smtClean="0"/>
-              <a:t>16/06/2024</a:t>
+              <a:t>1/02/2024</a:t>
             </a:fld>
             <a:endParaRPr lang="es-CO"/>
           </a:p>
@@ -2207,7 +2199,7 @@
           <a:p>
             <a:fld id="{50E0B805-1BA4-4D1C-BB31-7A9369EE73F8}" type="datetimeFigureOut">
               <a:rPr lang="es-CO" smtClean="0"/>
-              <a:t>16/06/2024</a:t>
+              <a:t>1/02/2024</a:t>
             </a:fld>
             <a:endParaRPr lang="es-CO"/>
           </a:p>
@@ -2453,7 +2445,7 @@
           <a:p>
             <a:fld id="{50E0B805-1BA4-4D1C-BB31-7A9369EE73F8}" type="datetimeFigureOut">
               <a:rPr lang="es-CO" smtClean="0"/>
-              <a:t>16/06/2024</a:t>
+              <a:t>1/02/2024</a:t>
             </a:fld>
             <a:endParaRPr lang="es-CO"/>
           </a:p>
@@ -2685,7 +2677,7 @@
           <a:p>
             <a:fld id="{50E0B805-1BA4-4D1C-BB31-7A9369EE73F8}" type="datetimeFigureOut">
               <a:rPr lang="es-CO" smtClean="0"/>
-              <a:t>16/06/2024</a:t>
+              <a:t>1/02/2024</a:t>
             </a:fld>
             <a:endParaRPr lang="es-CO"/>
           </a:p>
@@ -3052,7 +3044,7 @@
           <a:p>
             <a:fld id="{50E0B805-1BA4-4D1C-BB31-7A9369EE73F8}" type="datetimeFigureOut">
               <a:rPr lang="es-CO" smtClean="0"/>
-              <a:t>16/06/2024</a:t>
+              <a:t>1/02/2024</a:t>
             </a:fld>
             <a:endParaRPr lang="es-CO"/>
           </a:p>
@@ -3170,7 +3162,7 @@
           <a:p>
             <a:fld id="{50E0B805-1BA4-4D1C-BB31-7A9369EE73F8}" type="datetimeFigureOut">
               <a:rPr lang="es-CO" smtClean="0"/>
-              <a:t>16/06/2024</a:t>
+              <a:t>1/02/2024</a:t>
             </a:fld>
             <a:endParaRPr lang="es-CO"/>
           </a:p>
@@ -3265,7 +3257,7 @@
           <a:p>
             <a:fld id="{50E0B805-1BA4-4D1C-BB31-7A9369EE73F8}" type="datetimeFigureOut">
               <a:rPr lang="es-CO" smtClean="0"/>
-              <a:t>16/06/2024</a:t>
+              <a:t>1/02/2024</a:t>
             </a:fld>
             <a:endParaRPr lang="es-CO"/>
           </a:p>
@@ -3542,7 +3534,7 @@
           <a:p>
             <a:fld id="{50E0B805-1BA4-4D1C-BB31-7A9369EE73F8}" type="datetimeFigureOut">
               <a:rPr lang="es-CO" smtClean="0"/>
-              <a:t>16/06/2024</a:t>
+              <a:t>1/02/2024</a:t>
             </a:fld>
             <a:endParaRPr lang="es-CO"/>
           </a:p>
@@ -3799,7 +3791,7 @@
           <a:p>
             <a:fld id="{50E0B805-1BA4-4D1C-BB31-7A9369EE73F8}" type="datetimeFigureOut">
               <a:rPr lang="es-CO" smtClean="0"/>
-              <a:t>16/06/2024</a:t>
+              <a:t>1/02/2024</a:t>
             </a:fld>
             <a:endParaRPr lang="es-CO"/>
           </a:p>
@@ -4012,7 +4004,7 @@
           <a:p>
             <a:fld id="{50E0B805-1BA4-4D1C-BB31-7A9369EE73F8}" type="datetimeFigureOut">
               <a:rPr lang="es-CO" smtClean="0"/>
-              <a:t>16/06/2024</a:t>
+              <a:t>1/02/2024</a:t>
             </a:fld>
             <a:endParaRPr lang="es-CO"/>
           </a:p>
@@ -5529,7 +5521,7 @@
         <p:spPr>
           <a:xfrm>
             <a:off x="2231411" y="2497574"/>
-            <a:ext cx="3060045" cy="1320212"/>
+            <a:ext cx="4658050" cy="1320212"/>
           </a:xfrm>
           <a:prstGeom prst="roundRect">
             <a:avLst/>
@@ -5973,7 +5965,7 @@
         </p:blipFill>
         <p:spPr bwMode="auto">
           <a:xfrm>
-            <a:off x="7629362" y="2513350"/>
+            <a:off x="2322793" y="2608992"/>
             <a:ext cx="380361" cy="369332"/>
           </a:xfrm>
           <a:prstGeom prst="rect">
@@ -5996,7 +5988,7 @@
         </p:nvSpPr>
         <p:spPr>
           <a:xfrm>
-            <a:off x="7653189" y="2513350"/>
+            <a:off x="2346620" y="2608992"/>
             <a:ext cx="320922" cy="400110"/>
           </a:xfrm>
           <a:prstGeom prst="rect">
@@ -6697,59 +6689,6 @@
           </a:graphicData>
         </a:graphic>
       </p:graphicFrame>
-      <p:sp>
-        <p:nvSpPr>
-          <p:cNvPr id="47" name="Rectángulo: esquinas redondeadas 46">
-            <a:extLst>
-              <a:ext uri="{FF2B5EF4-FFF2-40B4-BE49-F238E27FC236}">
-                <a16:creationId xmlns:a16="http://schemas.microsoft.com/office/drawing/2014/main" id="{E7F8FF13-222E-91FD-596A-B83C13FE8437}"/>
-              </a:ext>
-            </a:extLst>
-          </p:cNvPr>
-          <p:cNvSpPr/>
-          <p:nvPr/>
-        </p:nvSpPr>
-        <p:spPr>
-          <a:xfrm>
-            <a:off x="5578299" y="2502589"/>
-            <a:ext cx="2471001" cy="1320212"/>
-          </a:xfrm>
-          <a:prstGeom prst="roundRect">
-            <a:avLst/>
-          </a:prstGeom>
-          <a:noFill/>
-          <a:ln w="25400">
-            <a:solidFill>
-              <a:srgbClr val="4472C4"/>
-            </a:solidFill>
-            <a:prstDash val="dash"/>
-          </a:ln>
-        </p:spPr>
-        <p:style>
-          <a:lnRef idx="2">
-            <a:schemeClr val="accent1">
-              <a:shade val="15000"/>
-            </a:schemeClr>
-          </a:lnRef>
-          <a:fillRef idx="1">
-            <a:schemeClr val="accent1"/>
-          </a:fillRef>
-          <a:effectRef idx="0">
-            <a:schemeClr val="accent1"/>
-          </a:effectRef>
-          <a:fontRef idx="minor">
-            <a:schemeClr val="lt1"/>
-          </a:fontRef>
-        </p:style>
-        <p:txBody>
-          <a:bodyPr rtlCol="0" anchor="ctr"/>
-          <a:lstStyle/>
-          <a:p>
-            <a:pPr algn="ctr"/>
-            <a:endParaRPr lang="es-CO"/>
-          </a:p>
-        </p:txBody>
-      </p:sp>
     </p:spTree>
     <p:extLst>
       <p:ext uri="{BB962C8B-B14F-4D97-AF65-F5344CB8AC3E}">

</xml_diff>

<commit_message>
dnn pool cidr change
</commit_message>
<xml_diff>
--- a/docs/Multi-cluster_test/Multicluster-test.pptx
+++ b/docs/Multi-cluster_test/Multicluster-test.pptx
@@ -116,7 +116,7 @@
 <file path=ppt/revisionInfo.xml><?xml version="1.0" encoding="utf-8"?>
 <p1510:revInfo xmlns:a="http://schemas.openxmlformats.org/drawingml/2006/main" xmlns:r="http://schemas.openxmlformats.org/officeDocument/2006/relationships" xmlns:p1510="http://schemas.microsoft.com/office/powerpoint/2015/10/main">
   <p1510:revLst>
-    <p1510:client id="{26CA862B-7CC0-49B5-9129-28CD4CF9333B}" v="244" dt="2024-02-04T02:18:56.153"/>
+    <p1510:client id="{26CA862B-7CC0-49B5-9129-28CD4CF9333B}" v="245" dt="2024-06-17T02:02:08.185"/>
   </p1510:revLst>
 </p1510:revInfo>
 </file>
@@ -126,12 +126,12 @@
   <pc:docChgLst>
     <pc:chgData name="Danilo José Granados" userId="bee369f06cde55e4" providerId="LiveId" clId="{26CA862B-7CC0-49B5-9129-28CD4CF9333B}"/>
     <pc:docChg chg="undo custSel addSld delSld modSld">
-      <pc:chgData name="Danilo José Granados" userId="bee369f06cde55e4" providerId="LiveId" clId="{26CA862B-7CC0-49B5-9129-28CD4CF9333B}" dt="2024-02-04T02:26:31.256" v="1299" actId="1076"/>
+      <pc:chgData name="Danilo José Granados" userId="bee369f06cde55e4" providerId="LiveId" clId="{26CA862B-7CC0-49B5-9129-28CD4CF9333B}" dt="2024-06-17T02:02:51.782" v="1310" actId="1076"/>
       <pc:docMkLst>
         <pc:docMk/>
       </pc:docMkLst>
       <pc:sldChg chg="addSp delSp modSp mod">
-        <pc:chgData name="Danilo José Granados" userId="bee369f06cde55e4" providerId="LiveId" clId="{26CA862B-7CC0-49B5-9129-28CD4CF9333B}" dt="2024-02-04T02:26:31.256" v="1299" actId="1076"/>
+        <pc:chgData name="Danilo José Granados" userId="bee369f06cde55e4" providerId="LiveId" clId="{26CA862B-7CC0-49B5-9129-28CD4CF9333B}" dt="2024-06-17T02:02:51.782" v="1310" actId="1076"/>
         <pc:sldMkLst>
           <pc:docMk/>
           <pc:sldMk cId="3293131006" sldId="256"/>
@@ -145,7 +145,7 @@
           </ac:spMkLst>
         </pc:spChg>
         <pc:spChg chg="add mod">
-          <ac:chgData name="Danilo José Granados" userId="bee369f06cde55e4" providerId="LiveId" clId="{26CA862B-7CC0-49B5-9129-28CD4CF9333B}" dt="2024-02-02T12:35:24.452" v="1117" actId="692"/>
+          <ac:chgData name="Danilo José Granados" userId="bee369f06cde55e4" providerId="LiveId" clId="{26CA862B-7CC0-49B5-9129-28CD4CF9333B}" dt="2024-06-17T02:02:02.032" v="1304" actId="14100"/>
           <ac:spMkLst>
             <pc:docMk/>
             <pc:sldMk cId="3293131006" sldId="256"/>
@@ -217,7 +217,7 @@
           </ac:spMkLst>
         </pc:spChg>
         <pc:spChg chg="mod">
-          <ac:chgData name="Danilo José Granados" userId="bee369f06cde55e4" providerId="LiveId" clId="{26CA862B-7CC0-49B5-9129-28CD4CF9333B}" dt="2024-02-02T00:31:03.392" v="1009" actId="1037"/>
+          <ac:chgData name="Danilo José Granados" userId="bee369f06cde55e4" providerId="LiveId" clId="{26CA862B-7CC0-49B5-9129-28CD4CF9333B}" dt="2024-06-17T02:01:52.652" v="1302" actId="1076"/>
           <ac:spMkLst>
             <pc:docMk/>
             <pc:sldMk cId="3293131006" sldId="256"/>
@@ -225,7 +225,7 @@
           </ac:spMkLst>
         </pc:spChg>
         <pc:spChg chg="mod">
-          <ac:chgData name="Danilo José Granados" userId="bee369f06cde55e4" providerId="LiveId" clId="{26CA862B-7CC0-49B5-9129-28CD4CF9333B}" dt="2024-02-02T00:31:03.392" v="1009" actId="1037"/>
+          <ac:chgData name="Danilo José Granados" userId="bee369f06cde55e4" providerId="LiveId" clId="{26CA862B-7CC0-49B5-9129-28CD4CF9333B}" dt="2024-06-17T02:01:53.235" v="1303" actId="1076"/>
           <ac:spMkLst>
             <pc:docMk/>
             <pc:sldMk cId="3293131006" sldId="256"/>
@@ -321,7 +321,7 @@
           </ac:spMkLst>
         </pc:spChg>
         <pc:spChg chg="add mod">
-          <ac:chgData name="Danilo José Granados" userId="bee369f06cde55e4" providerId="LiveId" clId="{26CA862B-7CC0-49B5-9129-28CD4CF9333B}" dt="2024-02-02T00:10:08.131" v="573" actId="1076"/>
+          <ac:chgData name="Danilo José Granados" userId="bee369f06cde55e4" providerId="LiveId" clId="{26CA862B-7CC0-49B5-9129-28CD4CF9333B}" dt="2024-06-17T02:02:51.782" v="1310" actId="1076"/>
           <ac:spMkLst>
             <pc:docMk/>
             <pc:sldMk cId="3293131006" sldId="256"/>
@@ -342,6 +342,14 @@
             <pc:docMk/>
             <pc:sldMk cId="3293131006" sldId="256"/>
             <ac:spMk id="45" creationId="{1F5EF80A-11FA-D842-CAAA-B3E58438F345}"/>
+          </ac:spMkLst>
+        </pc:spChg>
+        <pc:spChg chg="add mod">
+          <ac:chgData name="Danilo José Granados" userId="bee369f06cde55e4" providerId="LiveId" clId="{26CA862B-7CC0-49B5-9129-28CD4CF9333B}" dt="2024-06-17T02:02:20.043" v="1307" actId="14100"/>
+          <ac:spMkLst>
+            <pc:docMk/>
+            <pc:sldMk cId="3293131006" sldId="256"/>
+            <ac:spMk id="47" creationId="{E7F8FF13-222E-91FD-596A-B83C13FE8437}"/>
           </ac:spMkLst>
         </pc:spChg>
         <pc:spChg chg="add mod">
@@ -409,7 +417,7 @@
           </ac:picMkLst>
         </pc:picChg>
         <pc:picChg chg="add mod">
-          <ac:chgData name="Danilo José Granados" userId="bee369f06cde55e4" providerId="LiveId" clId="{26CA862B-7CC0-49B5-9129-28CD4CF9333B}" dt="2024-02-02T00:10:08.131" v="573" actId="1076"/>
+          <ac:chgData name="Danilo José Granados" userId="bee369f06cde55e4" providerId="LiveId" clId="{26CA862B-7CC0-49B5-9129-28CD4CF9333B}" dt="2024-06-17T02:02:51.782" v="1310" actId="1076"/>
           <ac:picMkLst>
             <pc:docMk/>
             <pc:sldMk cId="3293131006" sldId="256"/>
@@ -441,7 +449,7 @@
           </ac:picMkLst>
         </pc:picChg>
         <pc:cxnChg chg="mod">
-          <ac:chgData name="Danilo José Granados" userId="bee369f06cde55e4" providerId="LiveId" clId="{26CA862B-7CC0-49B5-9129-28CD4CF9333B}" dt="2024-02-02T00:31:03.392" v="1009" actId="1037"/>
+          <ac:chgData name="Danilo José Granados" userId="bee369f06cde55e4" providerId="LiveId" clId="{26CA862B-7CC0-49B5-9129-28CD4CF9333B}" dt="2024-06-17T02:01:52.652" v="1302" actId="1076"/>
           <ac:cxnSpMkLst>
             <pc:docMk/>
             <pc:sldMk cId="3293131006" sldId="256"/>
@@ -457,7 +465,7 @@
           </ac:cxnSpMkLst>
         </pc:cxnChg>
         <pc:cxnChg chg="mod">
-          <ac:chgData name="Danilo José Granados" userId="bee369f06cde55e4" providerId="LiveId" clId="{26CA862B-7CC0-49B5-9129-28CD4CF9333B}" dt="2024-02-02T00:31:03.392" v="1009" actId="1037"/>
+          <ac:chgData name="Danilo José Granados" userId="bee369f06cde55e4" providerId="LiveId" clId="{26CA862B-7CC0-49B5-9129-28CD4CF9333B}" dt="2024-06-17T02:01:52.652" v="1302" actId="1076"/>
           <ac:cxnSpMkLst>
             <pc:docMk/>
             <pc:sldMk cId="3293131006" sldId="256"/>
@@ -473,7 +481,7 @@
           </ac:cxnSpMkLst>
         </pc:cxnChg>
         <pc:cxnChg chg="mod">
-          <ac:chgData name="Danilo José Granados" userId="bee369f06cde55e4" providerId="LiveId" clId="{26CA862B-7CC0-49B5-9129-28CD4CF9333B}" dt="2024-02-02T00:31:03.392" v="1009" actId="1037"/>
+          <ac:chgData name="Danilo José Granados" userId="bee369f06cde55e4" providerId="LiveId" clId="{26CA862B-7CC0-49B5-9129-28CD4CF9333B}" dt="2024-06-17T02:01:53.235" v="1303" actId="1076"/>
           <ac:cxnSpMkLst>
             <pc:docMk/>
             <pc:sldMk cId="3293131006" sldId="256"/>
@@ -553,7 +561,7 @@
           </ac:cxnSpMkLst>
         </pc:cxnChg>
         <pc:cxnChg chg="mod">
-          <ac:chgData name="Danilo José Granados" userId="bee369f06cde55e4" providerId="LiveId" clId="{26CA862B-7CC0-49B5-9129-28CD4CF9333B}" dt="2024-02-02T00:31:03.392" v="1009" actId="1037"/>
+          <ac:chgData name="Danilo José Granados" userId="bee369f06cde55e4" providerId="LiveId" clId="{26CA862B-7CC0-49B5-9129-28CD4CF9333B}" dt="2024-06-17T02:01:53.235" v="1303" actId="1076"/>
           <ac:cxnSpMkLst>
             <pc:docMk/>
             <pc:sldMk cId="3293131006" sldId="256"/>
@@ -1679,7 +1687,7 @@
           <a:p>
             <a:fld id="{50E0B805-1BA4-4D1C-BB31-7A9369EE73F8}" type="datetimeFigureOut">
               <a:rPr lang="es-CO" smtClean="0"/>
-              <a:t>1/02/2024</a:t>
+              <a:t>16/06/2024</a:t>
             </a:fld>
             <a:endParaRPr lang="es-CO"/>
           </a:p>
@@ -1849,7 +1857,7 @@
           <a:p>
             <a:fld id="{50E0B805-1BA4-4D1C-BB31-7A9369EE73F8}" type="datetimeFigureOut">
               <a:rPr lang="es-CO" smtClean="0"/>
-              <a:t>1/02/2024</a:t>
+              <a:t>16/06/2024</a:t>
             </a:fld>
             <a:endParaRPr lang="es-CO"/>
           </a:p>
@@ -2029,7 +2037,7 @@
           <a:p>
             <a:fld id="{50E0B805-1BA4-4D1C-BB31-7A9369EE73F8}" type="datetimeFigureOut">
               <a:rPr lang="es-CO" smtClean="0"/>
-              <a:t>1/02/2024</a:t>
+              <a:t>16/06/2024</a:t>
             </a:fld>
             <a:endParaRPr lang="es-CO"/>
           </a:p>
@@ -2199,7 +2207,7 @@
           <a:p>
             <a:fld id="{50E0B805-1BA4-4D1C-BB31-7A9369EE73F8}" type="datetimeFigureOut">
               <a:rPr lang="es-CO" smtClean="0"/>
-              <a:t>1/02/2024</a:t>
+              <a:t>16/06/2024</a:t>
             </a:fld>
             <a:endParaRPr lang="es-CO"/>
           </a:p>
@@ -2445,7 +2453,7 @@
           <a:p>
             <a:fld id="{50E0B805-1BA4-4D1C-BB31-7A9369EE73F8}" type="datetimeFigureOut">
               <a:rPr lang="es-CO" smtClean="0"/>
-              <a:t>1/02/2024</a:t>
+              <a:t>16/06/2024</a:t>
             </a:fld>
             <a:endParaRPr lang="es-CO"/>
           </a:p>
@@ -2677,7 +2685,7 @@
           <a:p>
             <a:fld id="{50E0B805-1BA4-4D1C-BB31-7A9369EE73F8}" type="datetimeFigureOut">
               <a:rPr lang="es-CO" smtClean="0"/>
-              <a:t>1/02/2024</a:t>
+              <a:t>16/06/2024</a:t>
             </a:fld>
             <a:endParaRPr lang="es-CO"/>
           </a:p>
@@ -3044,7 +3052,7 @@
           <a:p>
             <a:fld id="{50E0B805-1BA4-4D1C-BB31-7A9369EE73F8}" type="datetimeFigureOut">
               <a:rPr lang="es-CO" smtClean="0"/>
-              <a:t>1/02/2024</a:t>
+              <a:t>16/06/2024</a:t>
             </a:fld>
             <a:endParaRPr lang="es-CO"/>
           </a:p>
@@ -3162,7 +3170,7 @@
           <a:p>
             <a:fld id="{50E0B805-1BA4-4D1C-BB31-7A9369EE73F8}" type="datetimeFigureOut">
               <a:rPr lang="es-CO" smtClean="0"/>
-              <a:t>1/02/2024</a:t>
+              <a:t>16/06/2024</a:t>
             </a:fld>
             <a:endParaRPr lang="es-CO"/>
           </a:p>
@@ -3257,7 +3265,7 @@
           <a:p>
             <a:fld id="{50E0B805-1BA4-4D1C-BB31-7A9369EE73F8}" type="datetimeFigureOut">
               <a:rPr lang="es-CO" smtClean="0"/>
-              <a:t>1/02/2024</a:t>
+              <a:t>16/06/2024</a:t>
             </a:fld>
             <a:endParaRPr lang="es-CO"/>
           </a:p>
@@ -3534,7 +3542,7 @@
           <a:p>
             <a:fld id="{50E0B805-1BA4-4D1C-BB31-7A9369EE73F8}" type="datetimeFigureOut">
               <a:rPr lang="es-CO" smtClean="0"/>
-              <a:t>1/02/2024</a:t>
+              <a:t>16/06/2024</a:t>
             </a:fld>
             <a:endParaRPr lang="es-CO"/>
           </a:p>
@@ -3791,7 +3799,7 @@
           <a:p>
             <a:fld id="{50E0B805-1BA4-4D1C-BB31-7A9369EE73F8}" type="datetimeFigureOut">
               <a:rPr lang="es-CO" smtClean="0"/>
-              <a:t>1/02/2024</a:t>
+              <a:t>16/06/2024</a:t>
             </a:fld>
             <a:endParaRPr lang="es-CO"/>
           </a:p>
@@ -4004,7 +4012,7 @@
           <a:p>
             <a:fld id="{50E0B805-1BA4-4D1C-BB31-7A9369EE73F8}" type="datetimeFigureOut">
               <a:rPr lang="es-CO" smtClean="0"/>
-              <a:t>1/02/2024</a:t>
+              <a:t>16/06/2024</a:t>
             </a:fld>
             <a:endParaRPr lang="es-CO"/>
           </a:p>
@@ -5521,7 +5529,7 @@
         <p:spPr>
           <a:xfrm>
             <a:off x="2231411" y="2497574"/>
-            <a:ext cx="4658050" cy="1320212"/>
+            <a:ext cx="3060045" cy="1320212"/>
           </a:xfrm>
           <a:prstGeom prst="roundRect">
             <a:avLst/>
@@ -5965,7 +5973,7 @@
         </p:blipFill>
         <p:spPr bwMode="auto">
           <a:xfrm>
-            <a:off x="2322793" y="2608992"/>
+            <a:off x="7629362" y="2513350"/>
             <a:ext cx="380361" cy="369332"/>
           </a:xfrm>
           <a:prstGeom prst="rect">
@@ -5988,7 +5996,7 @@
         </p:nvSpPr>
         <p:spPr>
           <a:xfrm>
-            <a:off x="2346620" y="2608992"/>
+            <a:off x="7653189" y="2513350"/>
             <a:ext cx="320922" cy="400110"/>
           </a:xfrm>
           <a:prstGeom prst="rect">
@@ -6689,6 +6697,59 @@
           </a:graphicData>
         </a:graphic>
       </p:graphicFrame>
+      <p:sp>
+        <p:nvSpPr>
+          <p:cNvPr id="47" name="Rectángulo: esquinas redondeadas 46">
+            <a:extLst>
+              <a:ext uri="{FF2B5EF4-FFF2-40B4-BE49-F238E27FC236}">
+                <a16:creationId xmlns:a16="http://schemas.microsoft.com/office/drawing/2014/main" id="{E7F8FF13-222E-91FD-596A-B83C13FE8437}"/>
+              </a:ext>
+            </a:extLst>
+          </p:cNvPr>
+          <p:cNvSpPr/>
+          <p:nvPr/>
+        </p:nvSpPr>
+        <p:spPr>
+          <a:xfrm>
+            <a:off x="5578299" y="2502589"/>
+            <a:ext cx="2471001" cy="1320212"/>
+          </a:xfrm>
+          <a:prstGeom prst="roundRect">
+            <a:avLst/>
+          </a:prstGeom>
+          <a:noFill/>
+          <a:ln w="25400">
+            <a:solidFill>
+              <a:srgbClr val="4472C4"/>
+            </a:solidFill>
+            <a:prstDash val="dash"/>
+          </a:ln>
+        </p:spPr>
+        <p:style>
+          <a:lnRef idx="2">
+            <a:schemeClr val="accent1">
+              <a:shade val="15000"/>
+            </a:schemeClr>
+          </a:lnRef>
+          <a:fillRef idx="1">
+            <a:schemeClr val="accent1"/>
+          </a:fillRef>
+          <a:effectRef idx="0">
+            <a:schemeClr val="accent1"/>
+          </a:effectRef>
+          <a:fontRef idx="minor">
+            <a:schemeClr val="lt1"/>
+          </a:fontRef>
+        </p:style>
+        <p:txBody>
+          <a:bodyPr rtlCol="0" anchor="ctr"/>
+          <a:lstStyle/>
+          <a:p>
+            <a:pPr algn="ctr"/>
+            <a:endParaRPr lang="es-CO"/>
+          </a:p>
+        </p:txBody>
+      </p:sp>
     </p:spTree>
     <p:extLst>
       <p:ext uri="{BB962C8B-B14F-4D97-AF65-F5344CB8AC3E}">

</xml_diff>